<commit_message>
Updated schematics and images.
</commit_message>
<xml_diff>
--- a/schematics/yelmo_figures.pptx
+++ b/schematics/yelmo_figures.pptx
@@ -6,7 +6,8 @@
   </p:sldMasterIdLst>
   <p:sldIdLst>
     <p:sldId id="259" r:id="rId2"/>
-    <p:sldId id="257" r:id="rId3"/>
+    <p:sldId id="260" r:id="rId3"/>
+    <p:sldId id="257" r:id="rId4"/>
   </p:sldIdLst>
   <p:sldSz cx="12192000" cy="6858000"/>
   <p:notesSz cx="6858000" cy="9144000"/>
@@ -3341,7 +3342,7 @@
         </p:nvSpPr>
         <p:spPr>
           <a:xfrm>
-            <a:off x="988358" y="851463"/>
+            <a:off x="546230" y="1554848"/>
             <a:ext cx="9056790" cy="3499473"/>
           </a:xfrm>
           <a:prstGeom prst="rect">
@@ -3400,7 +3401,7 @@
         </p:nvSpPr>
         <p:spPr>
           <a:xfrm>
-            <a:off x="6939859" y="1308538"/>
+            <a:off x="6497731" y="2011923"/>
             <a:ext cx="2906506" cy="2339102"/>
           </a:xfrm>
           <a:prstGeom prst="rect">
@@ -3522,7 +3523,7 @@
         </p:nvSpPr>
         <p:spPr>
           <a:xfrm>
-            <a:off x="1184125" y="1309981"/>
+            <a:off x="741997" y="2013366"/>
             <a:ext cx="2749905" cy="1354217"/>
           </a:xfrm>
           <a:prstGeom prst="rect">
@@ -3605,7 +3606,7 @@
         </p:nvSpPr>
         <p:spPr>
           <a:xfrm>
-            <a:off x="1184124" y="2774805"/>
+            <a:off x="741996" y="3478190"/>
             <a:ext cx="2749906" cy="1354217"/>
           </a:xfrm>
           <a:prstGeom prst="rect">
@@ -3687,7 +3688,7 @@
         </p:nvSpPr>
         <p:spPr>
           <a:xfrm>
-            <a:off x="4055366" y="2774805"/>
+            <a:off x="3613238" y="3478190"/>
             <a:ext cx="2749906" cy="1354217"/>
           </a:xfrm>
           <a:prstGeom prst="rect">
@@ -3759,7 +3760,7 @@
         </p:nvSpPr>
         <p:spPr>
           <a:xfrm>
-            <a:off x="4055366" y="1309981"/>
+            <a:off x="3613238" y="2013366"/>
             <a:ext cx="2749905" cy="1354217"/>
           </a:xfrm>
           <a:prstGeom prst="rect">
@@ -3841,7 +3842,7 @@
         </p:nvSpPr>
         <p:spPr>
           <a:xfrm>
-            <a:off x="988359" y="911751"/>
+            <a:off x="546231" y="1615136"/>
             <a:ext cx="9056790" cy="369332"/>
           </a:xfrm>
           <a:prstGeom prst="rect">
@@ -3881,6 +3882,1264 @@
 </file>
 
 <file path=ppt/slides/slide2.xml><?xml version="1.0" encoding="utf-8"?>
+<p:sld xmlns:a="http://schemas.openxmlformats.org/drawingml/2006/main" xmlns:r="http://schemas.openxmlformats.org/officeDocument/2006/relationships" xmlns:p="http://schemas.openxmlformats.org/presentationml/2006/main">
+  <p:cSld>
+    <p:spTree>
+      <p:nvGrpSpPr>
+        <p:cNvPr id="1" name=""/>
+        <p:cNvGrpSpPr/>
+        <p:nvPr/>
+      </p:nvGrpSpPr>
+      <p:grpSpPr>
+        <a:xfrm>
+          <a:off x="0" y="0"/>
+          <a:ext cx="0" cy="0"/>
+          <a:chOff x="0" y="0"/>
+          <a:chExt cx="0" cy="0"/>
+        </a:xfrm>
+      </p:grpSpPr>
+      <p:sp>
+        <p:nvSpPr>
+          <p:cNvPr id="14" name="Rectangle 13">
+            <a:extLst>
+              <a:ext uri="{FF2B5EF4-FFF2-40B4-BE49-F238E27FC236}">
+                <a16:creationId xmlns:a16="http://schemas.microsoft.com/office/drawing/2014/main" id="{6F139784-933A-3646-B767-F90797B35730}"/>
+              </a:ext>
+            </a:extLst>
+          </p:cNvPr>
+          <p:cNvSpPr/>
+          <p:nvPr/>
+        </p:nvSpPr>
+        <p:spPr>
+          <a:xfrm>
+            <a:off x="954592" y="1253397"/>
+            <a:ext cx="3537021" cy="3218119"/>
+          </a:xfrm>
+          <a:prstGeom prst="rect">
+            <a:avLst/>
+          </a:prstGeom>
+          <a:solidFill>
+            <a:schemeClr val="bg1">
+              <a:lumMod val="95000"/>
+            </a:schemeClr>
+          </a:solidFill>
+          <a:ln w="28575">
+            <a:solidFill>
+              <a:schemeClr val="tx1">
+                <a:lumMod val="50000"/>
+                <a:lumOff val="50000"/>
+              </a:schemeClr>
+            </a:solidFill>
+          </a:ln>
+        </p:spPr>
+        <p:style>
+          <a:lnRef idx="2">
+            <a:schemeClr val="accent1">
+              <a:shade val="50000"/>
+            </a:schemeClr>
+          </a:lnRef>
+          <a:fillRef idx="1">
+            <a:schemeClr val="accent1"/>
+          </a:fillRef>
+          <a:effectRef idx="0">
+            <a:schemeClr val="accent1"/>
+          </a:effectRef>
+          <a:fontRef idx="minor">
+            <a:schemeClr val="lt1"/>
+          </a:fontRef>
+        </p:style>
+        <p:txBody>
+          <a:bodyPr rtlCol="0" anchor="ctr"/>
+          <a:lstStyle/>
+          <a:p>
+            <a:pPr algn="ctr"/>
+            <a:endParaRPr lang="en-US" dirty="0"/>
+          </a:p>
+        </p:txBody>
+      </p:sp>
+      <p:sp>
+        <p:nvSpPr>
+          <p:cNvPr id="5" name="TextBox 4">
+            <a:extLst>
+              <a:ext uri="{FF2B5EF4-FFF2-40B4-BE49-F238E27FC236}">
+                <a16:creationId xmlns:a16="http://schemas.microsoft.com/office/drawing/2014/main" id="{DD7EB67F-501E-244F-89E1-650FC58E8A9B}"/>
+              </a:ext>
+            </a:extLst>
+          </p:cNvPr>
+          <p:cNvSpPr txBox="1"/>
+          <p:nvPr/>
+        </p:nvSpPr>
+        <p:spPr>
+          <a:xfrm>
+            <a:off x="1269849" y="1831050"/>
+            <a:ext cx="2906506" cy="2339102"/>
+          </a:xfrm>
+          <a:prstGeom prst="rect">
+            <a:avLst/>
+          </a:prstGeom>
+          <a:solidFill>
+            <a:schemeClr val="bg1"/>
+          </a:solidFill>
+          <a:ln w="38100">
+            <a:solidFill>
+              <a:schemeClr val="tx1"/>
+            </a:solidFill>
+          </a:ln>
+        </p:spPr>
+        <p:txBody>
+          <a:bodyPr wrap="square" rtlCol="0">
+            <a:spAutoFit/>
+          </a:bodyPr>
+          <a:lstStyle/>
+          <a:p>
+            <a:r>
+              <a:rPr lang="en-US" b="1" dirty="0"/>
+              <a:t>Boundary conditions</a:t>
+            </a:r>
+          </a:p>
+          <a:p>
+            <a:pPr marL="285750" indent="-285750">
+              <a:buFont typeface="Arial" panose="020B0604020202020204" pitchFamily="34" charset="0"/>
+              <a:buChar char="•"/>
+            </a:pPr>
+            <a:r>
+              <a:rPr lang="en-US" sz="1600" dirty="0"/>
+              <a:t>Bedrock elevation</a:t>
+            </a:r>
+          </a:p>
+          <a:p>
+            <a:pPr marL="285750" indent="-285750">
+              <a:buFont typeface="Arial" panose="020B0604020202020204" pitchFamily="34" charset="0"/>
+              <a:buChar char="•"/>
+            </a:pPr>
+            <a:r>
+              <a:rPr lang="en-US" sz="1600" dirty="0"/>
+              <a:t>Sea level</a:t>
+            </a:r>
+          </a:p>
+          <a:p>
+            <a:pPr marL="285750" indent="-285750">
+              <a:buFont typeface="Arial" panose="020B0604020202020204" pitchFamily="34" charset="0"/>
+              <a:buChar char="•"/>
+            </a:pPr>
+            <a:r>
+              <a:rPr lang="en-US" sz="1600" dirty="0"/>
+              <a:t>Sediment thickness</a:t>
+            </a:r>
+          </a:p>
+          <a:p>
+            <a:pPr marL="285750" indent="-285750">
+              <a:buFont typeface="Arial" panose="020B0604020202020204" pitchFamily="34" charset="0"/>
+              <a:buChar char="•"/>
+            </a:pPr>
+            <a:r>
+              <a:rPr lang="en-US" sz="1600" dirty="0"/>
+              <a:t>Surface mass balance</a:t>
+            </a:r>
+          </a:p>
+          <a:p>
+            <a:pPr marL="285750" indent="-285750">
+              <a:buFont typeface="Arial" panose="020B0604020202020204" pitchFamily="34" charset="0"/>
+              <a:buChar char="•"/>
+            </a:pPr>
+            <a:r>
+              <a:rPr lang="en-US" sz="1600" dirty="0"/>
+              <a:t>Surface ice temperature</a:t>
+            </a:r>
+          </a:p>
+          <a:p>
+            <a:pPr marL="285750" indent="-285750">
+              <a:buFont typeface="Arial" panose="020B0604020202020204" pitchFamily="34" charset="0"/>
+              <a:buChar char="•"/>
+            </a:pPr>
+            <a:r>
+              <a:rPr lang="en-US" sz="1600" dirty="0"/>
+              <a:t>Basal mass balance (marine)</a:t>
+            </a:r>
+          </a:p>
+          <a:p>
+            <a:pPr marL="285750" indent="-285750">
+              <a:buFont typeface="Arial" panose="020B0604020202020204" pitchFamily="34" charset="0"/>
+              <a:buChar char="•"/>
+            </a:pPr>
+            <a:r>
+              <a:rPr lang="en-US" sz="1600" dirty="0"/>
+              <a:t>Basal ice-shelf temperature</a:t>
+            </a:r>
+          </a:p>
+          <a:p>
+            <a:pPr marL="285750" indent="-285750">
+              <a:buFont typeface="Arial" panose="020B0604020202020204" pitchFamily="34" charset="0"/>
+              <a:buChar char="•"/>
+            </a:pPr>
+            <a:r>
+              <a:rPr lang="en-US" sz="1600" dirty="0"/>
+              <a:t>Geothermal heat flux</a:t>
+            </a:r>
+          </a:p>
+        </p:txBody>
+      </p:sp>
+      <p:sp>
+        <p:nvSpPr>
+          <p:cNvPr id="15" name="TextBox 14">
+            <a:extLst>
+              <a:ext uri="{FF2B5EF4-FFF2-40B4-BE49-F238E27FC236}">
+                <a16:creationId xmlns:a16="http://schemas.microsoft.com/office/drawing/2014/main" id="{17D10A3E-8941-2940-B870-FEAE8AE38A07}"/>
+              </a:ext>
+            </a:extLst>
+          </p:cNvPr>
+          <p:cNvSpPr txBox="1"/>
+          <p:nvPr/>
+        </p:nvSpPr>
+        <p:spPr>
+          <a:xfrm>
+            <a:off x="954592" y="1313685"/>
+            <a:ext cx="3537021" cy="369332"/>
+          </a:xfrm>
+          <a:prstGeom prst="rect">
+            <a:avLst/>
+          </a:prstGeom>
+          <a:noFill/>
+        </p:spPr>
+        <p:txBody>
+          <a:bodyPr wrap="square" rtlCol="0">
+            <a:spAutoFit/>
+          </a:bodyPr>
+          <a:lstStyle/>
+          <a:p>
+            <a:pPr algn="ctr"/>
+            <a:r>
+              <a:rPr lang="en-US" b="1" dirty="0" err="1"/>
+              <a:t>Yelmo</a:t>
+            </a:r>
+            <a:r>
+              <a:rPr lang="en-US" b="1" dirty="0"/>
+              <a:t> state variables</a:t>
+            </a:r>
+          </a:p>
+        </p:txBody>
+      </p:sp>
+      <p:sp>
+        <p:nvSpPr>
+          <p:cNvPr id="11" name="Rectangle 10">
+            <a:extLst>
+              <a:ext uri="{FF2B5EF4-FFF2-40B4-BE49-F238E27FC236}">
+                <a16:creationId xmlns:a16="http://schemas.microsoft.com/office/drawing/2014/main" id="{E1A6FB8F-15A8-9340-A5FA-442C50361D85}"/>
+              </a:ext>
+            </a:extLst>
+          </p:cNvPr>
+          <p:cNvSpPr/>
+          <p:nvPr/>
+        </p:nvSpPr>
+        <p:spPr>
+          <a:xfrm>
+            <a:off x="5799572" y="803869"/>
+            <a:ext cx="3537021" cy="5044272"/>
+          </a:xfrm>
+          <a:prstGeom prst="rect">
+            <a:avLst/>
+          </a:prstGeom>
+          <a:solidFill>
+            <a:schemeClr val="bg1">
+              <a:lumMod val="95000"/>
+            </a:schemeClr>
+          </a:solidFill>
+          <a:ln w="28575">
+            <a:solidFill>
+              <a:schemeClr val="tx1">
+                <a:lumMod val="50000"/>
+                <a:lumOff val="50000"/>
+              </a:schemeClr>
+            </a:solidFill>
+          </a:ln>
+        </p:spPr>
+        <p:style>
+          <a:lnRef idx="2">
+            <a:schemeClr val="accent1">
+              <a:shade val="50000"/>
+            </a:schemeClr>
+          </a:lnRef>
+          <a:fillRef idx="1">
+            <a:schemeClr val="accent1"/>
+          </a:fillRef>
+          <a:effectRef idx="0">
+            <a:schemeClr val="accent1"/>
+          </a:effectRef>
+          <a:fontRef idx="minor">
+            <a:schemeClr val="lt1"/>
+          </a:fontRef>
+        </p:style>
+        <p:txBody>
+          <a:bodyPr rtlCol="0" anchor="ctr"/>
+          <a:lstStyle/>
+          <a:p>
+            <a:pPr algn="ctr"/>
+            <a:endParaRPr lang="en-US" dirty="0"/>
+          </a:p>
+        </p:txBody>
+      </p:sp>
+      <p:sp>
+        <p:nvSpPr>
+          <p:cNvPr id="12" name="TextBox 11">
+            <a:extLst>
+              <a:ext uri="{FF2B5EF4-FFF2-40B4-BE49-F238E27FC236}">
+                <a16:creationId xmlns:a16="http://schemas.microsoft.com/office/drawing/2014/main" id="{10EF3C19-D98C-0744-9B62-E886EE4C0913}"/>
+              </a:ext>
+            </a:extLst>
+          </p:cNvPr>
+          <p:cNvSpPr txBox="1"/>
+          <p:nvPr/>
+        </p:nvSpPr>
+        <p:spPr>
+          <a:xfrm>
+            <a:off x="6114829" y="1601612"/>
+            <a:ext cx="2906506" cy="338554"/>
+          </a:xfrm>
+          <a:prstGeom prst="rect">
+            <a:avLst/>
+          </a:prstGeom>
+          <a:solidFill>
+            <a:schemeClr val="bg1"/>
+          </a:solidFill>
+          <a:ln w="12700">
+            <a:solidFill>
+              <a:schemeClr val="tx1"/>
+            </a:solidFill>
+          </a:ln>
+        </p:spPr>
+        <p:txBody>
+          <a:bodyPr wrap="square" rtlCol="0">
+            <a:spAutoFit/>
+          </a:bodyPr>
+          <a:lstStyle/>
+          <a:p>
+            <a:pPr algn="ctr"/>
+            <a:r>
+              <a:rPr lang="en-US" sz="1600" dirty="0" err="1"/>
+              <a:t>isos</a:t>
+            </a:r>
+            <a:endParaRPr lang="en-US" sz="1600" dirty="0"/>
+          </a:p>
+        </p:txBody>
+      </p:sp>
+      <p:sp>
+        <p:nvSpPr>
+          <p:cNvPr id="13" name="TextBox 12">
+            <a:extLst>
+              <a:ext uri="{FF2B5EF4-FFF2-40B4-BE49-F238E27FC236}">
+                <a16:creationId xmlns:a16="http://schemas.microsoft.com/office/drawing/2014/main" id="{4DCA43FE-5F07-6A45-8E39-8BBCE1980ED8}"/>
+              </a:ext>
+            </a:extLst>
+          </p:cNvPr>
+          <p:cNvSpPr txBox="1"/>
+          <p:nvPr/>
+        </p:nvSpPr>
+        <p:spPr>
+          <a:xfrm>
+            <a:off x="5799572" y="1084247"/>
+            <a:ext cx="3537021" cy="369332"/>
+          </a:xfrm>
+          <a:prstGeom prst="rect">
+            <a:avLst/>
+          </a:prstGeom>
+          <a:noFill/>
+        </p:spPr>
+        <p:txBody>
+          <a:bodyPr wrap="square" rtlCol="0">
+            <a:spAutoFit/>
+          </a:bodyPr>
+          <a:lstStyle/>
+          <a:p>
+            <a:pPr algn="ctr"/>
+            <a:r>
+              <a:rPr lang="en-US" b="1" dirty="0" err="1"/>
+              <a:t>YelmoX</a:t>
+            </a:r>
+            <a:r>
+              <a:rPr lang="en-US" b="1" dirty="0"/>
+              <a:t> libraries</a:t>
+            </a:r>
+          </a:p>
+        </p:txBody>
+      </p:sp>
+      <p:sp>
+        <p:nvSpPr>
+          <p:cNvPr id="16" name="TextBox 15">
+            <a:extLst>
+              <a:ext uri="{FF2B5EF4-FFF2-40B4-BE49-F238E27FC236}">
+                <a16:creationId xmlns:a16="http://schemas.microsoft.com/office/drawing/2014/main" id="{C3128D46-566C-2D45-BA7D-04BA1C1DE3AF}"/>
+              </a:ext>
+            </a:extLst>
+          </p:cNvPr>
+          <p:cNvSpPr txBox="1"/>
+          <p:nvPr/>
+        </p:nvSpPr>
+        <p:spPr>
+          <a:xfrm>
+            <a:off x="6114829" y="2167018"/>
+            <a:ext cx="2906506" cy="338554"/>
+          </a:xfrm>
+          <a:prstGeom prst="rect">
+            <a:avLst/>
+          </a:prstGeom>
+          <a:solidFill>
+            <a:schemeClr val="bg1"/>
+          </a:solidFill>
+          <a:ln w="12700">
+            <a:solidFill>
+              <a:schemeClr val="tx1"/>
+            </a:solidFill>
+          </a:ln>
+        </p:spPr>
+        <p:txBody>
+          <a:bodyPr wrap="square" rtlCol="0">
+            <a:spAutoFit/>
+          </a:bodyPr>
+          <a:lstStyle/>
+          <a:p>
+            <a:pPr algn="ctr"/>
+            <a:r>
+              <a:rPr lang="en-US" sz="1600" dirty="0" err="1"/>
+              <a:t>sealevel</a:t>
+            </a:r>
+            <a:endParaRPr lang="en-US" sz="1600" dirty="0"/>
+          </a:p>
+        </p:txBody>
+      </p:sp>
+      <p:sp>
+        <p:nvSpPr>
+          <p:cNvPr id="17" name="TextBox 16">
+            <a:extLst>
+              <a:ext uri="{FF2B5EF4-FFF2-40B4-BE49-F238E27FC236}">
+                <a16:creationId xmlns:a16="http://schemas.microsoft.com/office/drawing/2014/main" id="{3D09B0C8-D418-DA47-8148-D14CF56288AD}"/>
+              </a:ext>
+            </a:extLst>
+          </p:cNvPr>
+          <p:cNvSpPr txBox="1"/>
+          <p:nvPr/>
+        </p:nvSpPr>
+        <p:spPr>
+          <a:xfrm>
+            <a:off x="6114829" y="2732424"/>
+            <a:ext cx="2906506" cy="338554"/>
+          </a:xfrm>
+          <a:prstGeom prst="rect">
+            <a:avLst/>
+          </a:prstGeom>
+          <a:solidFill>
+            <a:schemeClr val="bg1"/>
+          </a:solidFill>
+          <a:ln w="12700">
+            <a:solidFill>
+              <a:schemeClr val="tx1"/>
+            </a:solidFill>
+          </a:ln>
+        </p:spPr>
+        <p:txBody>
+          <a:bodyPr wrap="square" rtlCol="0">
+            <a:spAutoFit/>
+          </a:bodyPr>
+          <a:lstStyle/>
+          <a:p>
+            <a:pPr algn="ctr"/>
+            <a:r>
+              <a:rPr lang="en-US" sz="1600" dirty="0"/>
+              <a:t>sediments</a:t>
+            </a:r>
+          </a:p>
+        </p:txBody>
+      </p:sp>
+      <p:sp>
+        <p:nvSpPr>
+          <p:cNvPr id="18" name="TextBox 17">
+            <a:extLst>
+              <a:ext uri="{FF2B5EF4-FFF2-40B4-BE49-F238E27FC236}">
+                <a16:creationId xmlns:a16="http://schemas.microsoft.com/office/drawing/2014/main" id="{68A805A9-018B-9645-8A51-EDA1FCBCB2EC}"/>
+              </a:ext>
+            </a:extLst>
+          </p:cNvPr>
+          <p:cNvSpPr txBox="1"/>
+          <p:nvPr/>
+        </p:nvSpPr>
+        <p:spPr>
+          <a:xfrm>
+            <a:off x="6114829" y="3297830"/>
+            <a:ext cx="2906506" cy="338554"/>
+          </a:xfrm>
+          <a:prstGeom prst="rect">
+            <a:avLst/>
+          </a:prstGeom>
+          <a:solidFill>
+            <a:schemeClr val="bg1"/>
+          </a:solidFill>
+          <a:ln w="12700">
+            <a:solidFill>
+              <a:schemeClr val="tx1"/>
+            </a:solidFill>
+          </a:ln>
+        </p:spPr>
+        <p:txBody>
+          <a:bodyPr wrap="square" rtlCol="0">
+            <a:spAutoFit/>
+          </a:bodyPr>
+          <a:lstStyle/>
+          <a:p>
+            <a:pPr algn="ctr"/>
+            <a:r>
+              <a:rPr lang="en-US" sz="1600" dirty="0" err="1"/>
+              <a:t>smbpal</a:t>
+            </a:r>
+            <a:endParaRPr lang="en-US" sz="1600" dirty="0"/>
+          </a:p>
+        </p:txBody>
+      </p:sp>
+      <p:sp>
+        <p:nvSpPr>
+          <p:cNvPr id="19" name="TextBox 18">
+            <a:extLst>
+              <a:ext uri="{FF2B5EF4-FFF2-40B4-BE49-F238E27FC236}">
+                <a16:creationId xmlns:a16="http://schemas.microsoft.com/office/drawing/2014/main" id="{4763BF20-0BA6-1A4C-895B-11C915214DE5}"/>
+              </a:ext>
+            </a:extLst>
+          </p:cNvPr>
+          <p:cNvSpPr txBox="1"/>
+          <p:nvPr/>
+        </p:nvSpPr>
+        <p:spPr>
+          <a:xfrm>
+            <a:off x="6114829" y="3863236"/>
+            <a:ext cx="2906506" cy="338554"/>
+          </a:xfrm>
+          <a:prstGeom prst="rect">
+            <a:avLst/>
+          </a:prstGeom>
+          <a:solidFill>
+            <a:schemeClr val="bg1"/>
+          </a:solidFill>
+          <a:ln w="12700">
+            <a:solidFill>
+              <a:schemeClr val="tx1"/>
+            </a:solidFill>
+          </a:ln>
+        </p:spPr>
+        <p:txBody>
+          <a:bodyPr wrap="square" rtlCol="0">
+            <a:spAutoFit/>
+          </a:bodyPr>
+          <a:lstStyle/>
+          <a:p>
+            <a:pPr algn="ctr"/>
+            <a:r>
+              <a:rPr lang="en-US" sz="1600" dirty="0" err="1"/>
+              <a:t>marine_shelf</a:t>
+            </a:r>
+            <a:r>
+              <a:rPr lang="en-US" sz="1600" dirty="0"/>
+              <a:t>, </a:t>
+            </a:r>
+            <a:r>
+              <a:rPr lang="en-US" sz="1600" dirty="0" err="1"/>
+              <a:t>pico</a:t>
+            </a:r>
+            <a:endParaRPr lang="en-US" sz="1600" dirty="0"/>
+          </a:p>
+        </p:txBody>
+      </p:sp>
+      <p:sp>
+        <p:nvSpPr>
+          <p:cNvPr id="20" name="TextBox 19">
+            <a:extLst>
+              <a:ext uri="{FF2B5EF4-FFF2-40B4-BE49-F238E27FC236}">
+                <a16:creationId xmlns:a16="http://schemas.microsoft.com/office/drawing/2014/main" id="{C85BF0F0-92F8-D647-B709-1DEF278C932D}"/>
+              </a:ext>
+            </a:extLst>
+          </p:cNvPr>
+          <p:cNvSpPr txBox="1"/>
+          <p:nvPr/>
+        </p:nvSpPr>
+        <p:spPr>
+          <a:xfrm>
+            <a:off x="6114829" y="4428642"/>
+            <a:ext cx="2906506" cy="338554"/>
+          </a:xfrm>
+          <a:prstGeom prst="rect">
+            <a:avLst/>
+          </a:prstGeom>
+          <a:solidFill>
+            <a:schemeClr val="bg1"/>
+          </a:solidFill>
+          <a:ln w="12700">
+            <a:solidFill>
+              <a:schemeClr val="tx1"/>
+            </a:solidFill>
+          </a:ln>
+        </p:spPr>
+        <p:txBody>
+          <a:bodyPr wrap="square" rtlCol="0">
+            <a:spAutoFit/>
+          </a:bodyPr>
+          <a:lstStyle/>
+          <a:p>
+            <a:pPr algn="ctr"/>
+            <a:r>
+              <a:rPr lang="en-US" sz="1600" dirty="0"/>
+              <a:t>geothermal</a:t>
+            </a:r>
+          </a:p>
+        </p:txBody>
+      </p:sp>
+      <p:cxnSp>
+        <p:nvCxnSpPr>
+          <p:cNvPr id="3" name="Straight Arrow Connector 2">
+            <a:extLst>
+              <a:ext uri="{FF2B5EF4-FFF2-40B4-BE49-F238E27FC236}">
+                <a16:creationId xmlns:a16="http://schemas.microsoft.com/office/drawing/2014/main" id="{DBB61156-645B-764B-9D5E-908411162815}"/>
+              </a:ext>
+            </a:extLst>
+          </p:cNvPr>
+          <p:cNvCxnSpPr>
+            <a:cxnSpLocks/>
+            <a:stCxn id="12" idx="1"/>
+          </p:cNvCxnSpPr>
+          <p:nvPr/>
+        </p:nvCxnSpPr>
+        <p:spPr>
+          <a:xfrm flipH="1">
+            <a:off x="3215473" y="1770889"/>
+            <a:ext cx="2899356" cy="516641"/>
+          </a:xfrm>
+          <a:prstGeom prst="straightConnector1">
+            <a:avLst/>
+          </a:prstGeom>
+          <a:ln w="12700">
+            <a:solidFill>
+              <a:schemeClr val="tx1">
+                <a:lumMod val="65000"/>
+                <a:lumOff val="35000"/>
+              </a:schemeClr>
+            </a:solidFill>
+            <a:tailEnd type="triangle"/>
+          </a:ln>
+        </p:spPr>
+        <p:style>
+          <a:lnRef idx="1">
+            <a:schemeClr val="accent1"/>
+          </a:lnRef>
+          <a:fillRef idx="0">
+            <a:schemeClr val="accent1"/>
+          </a:fillRef>
+          <a:effectRef idx="0">
+            <a:schemeClr val="accent1"/>
+          </a:effectRef>
+          <a:fontRef idx="minor">
+            <a:schemeClr val="tx1"/>
+          </a:fontRef>
+        </p:style>
+      </p:cxnSp>
+      <p:cxnSp>
+        <p:nvCxnSpPr>
+          <p:cNvPr id="21" name="Straight Arrow Connector 20">
+            <a:extLst>
+              <a:ext uri="{FF2B5EF4-FFF2-40B4-BE49-F238E27FC236}">
+                <a16:creationId xmlns:a16="http://schemas.microsoft.com/office/drawing/2014/main" id="{0F5CC9B1-D563-4643-9477-50784011E8B3}"/>
+              </a:ext>
+            </a:extLst>
+          </p:cNvPr>
+          <p:cNvCxnSpPr>
+            <a:cxnSpLocks/>
+            <a:stCxn id="16" idx="1"/>
+          </p:cNvCxnSpPr>
+          <p:nvPr/>
+        </p:nvCxnSpPr>
+        <p:spPr>
+          <a:xfrm flipH="1">
+            <a:off x="2512089" y="2336295"/>
+            <a:ext cx="3602740" cy="188077"/>
+          </a:xfrm>
+          <a:prstGeom prst="straightConnector1">
+            <a:avLst/>
+          </a:prstGeom>
+          <a:ln w="12700">
+            <a:solidFill>
+              <a:schemeClr val="tx1">
+                <a:lumMod val="65000"/>
+                <a:lumOff val="35000"/>
+              </a:schemeClr>
+            </a:solidFill>
+            <a:tailEnd type="triangle"/>
+          </a:ln>
+        </p:spPr>
+        <p:style>
+          <a:lnRef idx="1">
+            <a:schemeClr val="accent1"/>
+          </a:lnRef>
+          <a:fillRef idx="0">
+            <a:schemeClr val="accent1"/>
+          </a:fillRef>
+          <a:effectRef idx="0">
+            <a:schemeClr val="accent1"/>
+          </a:effectRef>
+          <a:fontRef idx="minor">
+            <a:schemeClr val="tx1"/>
+          </a:fontRef>
+        </p:style>
+      </p:cxnSp>
+      <p:cxnSp>
+        <p:nvCxnSpPr>
+          <p:cNvPr id="22" name="Straight Arrow Connector 21">
+            <a:extLst>
+              <a:ext uri="{FF2B5EF4-FFF2-40B4-BE49-F238E27FC236}">
+                <a16:creationId xmlns:a16="http://schemas.microsoft.com/office/drawing/2014/main" id="{6A832D59-F0FB-6243-B19A-123486E3984D}"/>
+              </a:ext>
+            </a:extLst>
+          </p:cNvPr>
+          <p:cNvCxnSpPr>
+            <a:cxnSpLocks/>
+            <a:stCxn id="17" idx="1"/>
+          </p:cNvCxnSpPr>
+          <p:nvPr/>
+        </p:nvCxnSpPr>
+        <p:spPr>
+          <a:xfrm flipH="1" flipV="1">
+            <a:off x="3376247" y="2789478"/>
+            <a:ext cx="2738582" cy="112223"/>
+          </a:xfrm>
+          <a:prstGeom prst="straightConnector1">
+            <a:avLst/>
+          </a:prstGeom>
+          <a:ln w="12700">
+            <a:solidFill>
+              <a:schemeClr val="tx1">
+                <a:lumMod val="65000"/>
+                <a:lumOff val="35000"/>
+              </a:schemeClr>
+            </a:solidFill>
+            <a:tailEnd type="triangle"/>
+          </a:ln>
+        </p:spPr>
+        <p:style>
+          <a:lnRef idx="1">
+            <a:schemeClr val="accent1"/>
+          </a:lnRef>
+          <a:fillRef idx="0">
+            <a:schemeClr val="accent1"/>
+          </a:fillRef>
+          <a:effectRef idx="0">
+            <a:schemeClr val="accent1"/>
+          </a:effectRef>
+          <a:fontRef idx="minor">
+            <a:schemeClr val="tx1"/>
+          </a:fontRef>
+        </p:style>
+      </p:cxnSp>
+      <p:cxnSp>
+        <p:nvCxnSpPr>
+          <p:cNvPr id="25" name="Straight Arrow Connector 24">
+            <a:extLst>
+              <a:ext uri="{FF2B5EF4-FFF2-40B4-BE49-F238E27FC236}">
+                <a16:creationId xmlns:a16="http://schemas.microsoft.com/office/drawing/2014/main" id="{A3098347-CD8D-1646-B44E-ED8BB0497AA3}"/>
+              </a:ext>
+            </a:extLst>
+          </p:cNvPr>
+          <p:cNvCxnSpPr>
+            <a:cxnSpLocks/>
+            <a:stCxn id="18" idx="1"/>
+          </p:cNvCxnSpPr>
+          <p:nvPr/>
+        </p:nvCxnSpPr>
+        <p:spPr>
+          <a:xfrm flipH="1" flipV="1">
+            <a:off x="3516923" y="3025470"/>
+            <a:ext cx="2597906" cy="441637"/>
+          </a:xfrm>
+          <a:prstGeom prst="straightConnector1">
+            <a:avLst/>
+          </a:prstGeom>
+          <a:ln w="12700">
+            <a:solidFill>
+              <a:schemeClr val="tx1">
+                <a:lumMod val="65000"/>
+                <a:lumOff val="35000"/>
+              </a:schemeClr>
+            </a:solidFill>
+            <a:tailEnd type="triangle"/>
+          </a:ln>
+        </p:spPr>
+        <p:style>
+          <a:lnRef idx="1">
+            <a:schemeClr val="accent1"/>
+          </a:lnRef>
+          <a:fillRef idx="0">
+            <a:schemeClr val="accent1"/>
+          </a:fillRef>
+          <a:effectRef idx="0">
+            <a:schemeClr val="accent1"/>
+          </a:effectRef>
+          <a:fontRef idx="minor">
+            <a:schemeClr val="tx1"/>
+          </a:fontRef>
+        </p:style>
+      </p:cxnSp>
+      <p:cxnSp>
+        <p:nvCxnSpPr>
+          <p:cNvPr id="28" name="Straight Arrow Connector 27">
+            <a:extLst>
+              <a:ext uri="{FF2B5EF4-FFF2-40B4-BE49-F238E27FC236}">
+                <a16:creationId xmlns:a16="http://schemas.microsoft.com/office/drawing/2014/main" id="{C32AD890-5899-6C4F-ACA5-7F91BF414226}"/>
+              </a:ext>
+            </a:extLst>
+          </p:cNvPr>
+          <p:cNvCxnSpPr>
+            <a:cxnSpLocks/>
+            <a:stCxn id="18" idx="1"/>
+          </p:cNvCxnSpPr>
+          <p:nvPr/>
+        </p:nvCxnSpPr>
+        <p:spPr>
+          <a:xfrm flipH="1" flipV="1">
+            <a:off x="3707843" y="3258588"/>
+            <a:ext cx="2406986" cy="208519"/>
+          </a:xfrm>
+          <a:prstGeom prst="straightConnector1">
+            <a:avLst/>
+          </a:prstGeom>
+          <a:ln w="12700">
+            <a:solidFill>
+              <a:schemeClr val="tx1">
+                <a:lumMod val="65000"/>
+                <a:lumOff val="35000"/>
+              </a:schemeClr>
+            </a:solidFill>
+            <a:tailEnd type="triangle"/>
+          </a:ln>
+        </p:spPr>
+        <p:style>
+          <a:lnRef idx="1">
+            <a:schemeClr val="accent1"/>
+          </a:lnRef>
+          <a:fillRef idx="0">
+            <a:schemeClr val="accent1"/>
+          </a:fillRef>
+          <a:effectRef idx="0">
+            <a:schemeClr val="accent1"/>
+          </a:effectRef>
+          <a:fontRef idx="minor">
+            <a:schemeClr val="tx1"/>
+          </a:fontRef>
+        </p:style>
+      </p:cxnSp>
+      <p:cxnSp>
+        <p:nvCxnSpPr>
+          <p:cNvPr id="31" name="Straight Arrow Connector 30">
+            <a:extLst>
+              <a:ext uri="{FF2B5EF4-FFF2-40B4-BE49-F238E27FC236}">
+                <a16:creationId xmlns:a16="http://schemas.microsoft.com/office/drawing/2014/main" id="{1722220F-4401-624A-8650-63217134D201}"/>
+              </a:ext>
+            </a:extLst>
+          </p:cNvPr>
+          <p:cNvCxnSpPr>
+            <a:cxnSpLocks/>
+            <a:stCxn id="19" idx="1"/>
+          </p:cNvCxnSpPr>
+          <p:nvPr/>
+        </p:nvCxnSpPr>
+        <p:spPr>
+          <a:xfrm flipH="1" flipV="1">
+            <a:off x="4049486" y="3527268"/>
+            <a:ext cx="2065343" cy="505245"/>
+          </a:xfrm>
+          <a:prstGeom prst="straightConnector1">
+            <a:avLst/>
+          </a:prstGeom>
+          <a:ln w="12700">
+            <a:solidFill>
+              <a:schemeClr val="tx1">
+                <a:lumMod val="65000"/>
+                <a:lumOff val="35000"/>
+              </a:schemeClr>
+            </a:solidFill>
+            <a:tailEnd type="triangle"/>
+          </a:ln>
+        </p:spPr>
+        <p:style>
+          <a:lnRef idx="1">
+            <a:schemeClr val="accent1"/>
+          </a:lnRef>
+          <a:fillRef idx="0">
+            <a:schemeClr val="accent1"/>
+          </a:fillRef>
+          <a:effectRef idx="0">
+            <a:schemeClr val="accent1"/>
+          </a:effectRef>
+          <a:fontRef idx="minor">
+            <a:schemeClr val="tx1"/>
+          </a:fontRef>
+        </p:style>
+      </p:cxnSp>
+      <p:cxnSp>
+        <p:nvCxnSpPr>
+          <p:cNvPr id="34" name="Straight Arrow Connector 33">
+            <a:extLst>
+              <a:ext uri="{FF2B5EF4-FFF2-40B4-BE49-F238E27FC236}">
+                <a16:creationId xmlns:a16="http://schemas.microsoft.com/office/drawing/2014/main" id="{FFF293A3-F980-6C49-90B0-EEDF0AD9B98C}"/>
+              </a:ext>
+            </a:extLst>
+          </p:cNvPr>
+          <p:cNvCxnSpPr>
+            <a:cxnSpLocks/>
+            <a:stCxn id="19" idx="1"/>
+          </p:cNvCxnSpPr>
+          <p:nvPr/>
+        </p:nvCxnSpPr>
+        <p:spPr>
+          <a:xfrm flipH="1" flipV="1">
+            <a:off x="3969099" y="3759685"/>
+            <a:ext cx="2145730" cy="272828"/>
+          </a:xfrm>
+          <a:prstGeom prst="straightConnector1">
+            <a:avLst/>
+          </a:prstGeom>
+          <a:ln w="12700">
+            <a:solidFill>
+              <a:schemeClr val="tx1">
+                <a:lumMod val="65000"/>
+                <a:lumOff val="35000"/>
+              </a:schemeClr>
+            </a:solidFill>
+            <a:tailEnd type="triangle"/>
+          </a:ln>
+        </p:spPr>
+        <p:style>
+          <a:lnRef idx="1">
+            <a:schemeClr val="accent1"/>
+          </a:lnRef>
+          <a:fillRef idx="0">
+            <a:schemeClr val="accent1"/>
+          </a:fillRef>
+          <a:effectRef idx="0">
+            <a:schemeClr val="accent1"/>
+          </a:effectRef>
+          <a:fontRef idx="minor">
+            <a:schemeClr val="tx1"/>
+          </a:fontRef>
+        </p:style>
+      </p:cxnSp>
+      <p:cxnSp>
+        <p:nvCxnSpPr>
+          <p:cNvPr id="37" name="Straight Arrow Connector 36">
+            <a:extLst>
+              <a:ext uri="{FF2B5EF4-FFF2-40B4-BE49-F238E27FC236}">
+                <a16:creationId xmlns:a16="http://schemas.microsoft.com/office/drawing/2014/main" id="{61B591AE-8CEF-3840-8A7F-54E14EFE5EA9}"/>
+              </a:ext>
+            </a:extLst>
+          </p:cNvPr>
+          <p:cNvCxnSpPr>
+            <a:cxnSpLocks/>
+            <a:stCxn id="20" idx="1"/>
+          </p:cNvCxnSpPr>
+          <p:nvPr/>
+        </p:nvCxnSpPr>
+        <p:spPr>
+          <a:xfrm flipH="1" flipV="1">
+            <a:off x="3516923" y="4032513"/>
+            <a:ext cx="2597906" cy="565406"/>
+          </a:xfrm>
+          <a:prstGeom prst="straightConnector1">
+            <a:avLst/>
+          </a:prstGeom>
+          <a:ln w="12700">
+            <a:solidFill>
+              <a:schemeClr val="tx1">
+                <a:lumMod val="65000"/>
+                <a:lumOff val="35000"/>
+              </a:schemeClr>
+            </a:solidFill>
+            <a:tailEnd type="triangle"/>
+          </a:ln>
+        </p:spPr>
+        <p:style>
+          <a:lnRef idx="1">
+            <a:schemeClr val="accent1"/>
+          </a:lnRef>
+          <a:fillRef idx="0">
+            <a:schemeClr val="accent1"/>
+          </a:fillRef>
+          <a:effectRef idx="0">
+            <a:schemeClr val="accent1"/>
+          </a:effectRef>
+          <a:fontRef idx="minor">
+            <a:schemeClr val="tx1"/>
+          </a:fontRef>
+        </p:style>
+      </p:cxnSp>
+      <p:sp>
+        <p:nvSpPr>
+          <p:cNvPr id="44" name="TextBox 43">
+            <a:extLst>
+              <a:ext uri="{FF2B5EF4-FFF2-40B4-BE49-F238E27FC236}">
+                <a16:creationId xmlns:a16="http://schemas.microsoft.com/office/drawing/2014/main" id="{AE21BB1C-089B-914F-93F7-F9BDCC50BCE8}"/>
+              </a:ext>
+            </a:extLst>
+          </p:cNvPr>
+          <p:cNvSpPr txBox="1"/>
+          <p:nvPr/>
+        </p:nvSpPr>
+        <p:spPr>
+          <a:xfrm>
+            <a:off x="6114829" y="4994048"/>
+            <a:ext cx="2906506" cy="338554"/>
+          </a:xfrm>
+          <a:prstGeom prst="rect">
+            <a:avLst/>
+          </a:prstGeom>
+          <a:solidFill>
+            <a:schemeClr val="bg1"/>
+          </a:solidFill>
+          <a:ln w="12700">
+            <a:solidFill>
+              <a:schemeClr val="tx1"/>
+            </a:solidFill>
+          </a:ln>
+        </p:spPr>
+        <p:txBody>
+          <a:bodyPr wrap="square" rtlCol="0">
+            <a:spAutoFit/>
+          </a:bodyPr>
+          <a:lstStyle/>
+          <a:p>
+            <a:pPr algn="ctr"/>
+            <a:r>
+              <a:rPr lang="en-US" sz="1600" dirty="0" err="1"/>
+              <a:t>snapclim</a:t>
+            </a:r>
+            <a:endParaRPr lang="en-US" sz="1600" dirty="0"/>
+          </a:p>
+        </p:txBody>
+      </p:sp>
+      <p:sp>
+        <p:nvSpPr>
+          <p:cNvPr id="45" name="Freeform 44">
+            <a:extLst>
+              <a:ext uri="{FF2B5EF4-FFF2-40B4-BE49-F238E27FC236}">
+                <a16:creationId xmlns:a16="http://schemas.microsoft.com/office/drawing/2014/main" id="{91237A67-5F5F-E84D-BA70-9CAF2E0D5358}"/>
+              </a:ext>
+            </a:extLst>
+          </p:cNvPr>
+          <p:cNvSpPr/>
+          <p:nvPr/>
+        </p:nvSpPr>
+        <p:spPr>
+          <a:xfrm>
+            <a:off x="9033468" y="4016608"/>
+            <a:ext cx="890391" cy="1158293"/>
+          </a:xfrm>
+          <a:custGeom>
+            <a:avLst/>
+            <a:gdLst>
+              <a:gd name="connsiteX0" fmla="*/ 10048 w 890391"/>
+              <a:gd name="connsiteY0" fmla="*/ 1158293 h 1158293"/>
+              <a:gd name="connsiteX1" fmla="*/ 854110 w 890391"/>
+              <a:gd name="connsiteY1" fmla="*/ 706117 h 1158293"/>
+              <a:gd name="connsiteX2" fmla="*/ 663191 w 890391"/>
+              <a:gd name="connsiteY2" fmla="*/ 93168 h 1158293"/>
+              <a:gd name="connsiteX3" fmla="*/ 0 w 890391"/>
+              <a:gd name="connsiteY3" fmla="*/ 12781 h 1158293"/>
+            </a:gdLst>
+            <a:ahLst/>
+            <a:cxnLst>
+              <a:cxn ang="0">
+                <a:pos x="connsiteX0" y="connsiteY0"/>
+              </a:cxn>
+              <a:cxn ang="0">
+                <a:pos x="connsiteX1" y="connsiteY1"/>
+              </a:cxn>
+              <a:cxn ang="0">
+                <a:pos x="connsiteX2" y="connsiteY2"/>
+              </a:cxn>
+              <a:cxn ang="0">
+                <a:pos x="connsiteX3" y="connsiteY3"/>
+              </a:cxn>
+            </a:cxnLst>
+            <a:rect l="l" t="t" r="r" b="b"/>
+            <a:pathLst>
+              <a:path w="890391" h="1158293">
+                <a:moveTo>
+                  <a:pt x="10048" y="1158293"/>
+                </a:moveTo>
+                <a:cubicBezTo>
+                  <a:pt x="377650" y="1020965"/>
+                  <a:pt x="745253" y="883638"/>
+                  <a:pt x="854110" y="706117"/>
+                </a:cubicBezTo>
+                <a:cubicBezTo>
+                  <a:pt x="962967" y="528596"/>
+                  <a:pt x="805543" y="208724"/>
+                  <a:pt x="663191" y="93168"/>
+                </a:cubicBezTo>
+                <a:cubicBezTo>
+                  <a:pt x="520839" y="-22388"/>
+                  <a:pt x="260419" y="-4804"/>
+                  <a:pt x="0" y="12781"/>
+                </a:cubicBezTo>
+              </a:path>
+            </a:pathLst>
+          </a:custGeom>
+          <a:noFill/>
+          <a:ln>
+            <a:solidFill>
+              <a:schemeClr val="tx1">
+                <a:lumMod val="65000"/>
+                <a:lumOff val="35000"/>
+              </a:schemeClr>
+            </a:solidFill>
+            <a:headEnd type="none" w="med" len="med"/>
+            <a:tailEnd type="triangle" w="med" len="med"/>
+          </a:ln>
+        </p:spPr>
+        <p:style>
+          <a:lnRef idx="2">
+            <a:schemeClr val="accent1">
+              <a:shade val="50000"/>
+            </a:schemeClr>
+          </a:lnRef>
+          <a:fillRef idx="1">
+            <a:schemeClr val="accent1"/>
+          </a:fillRef>
+          <a:effectRef idx="0">
+            <a:schemeClr val="accent1"/>
+          </a:effectRef>
+          <a:fontRef idx="minor">
+            <a:schemeClr val="lt1"/>
+          </a:fontRef>
+        </p:style>
+        <p:txBody>
+          <a:bodyPr rtlCol="0" anchor="ctr"/>
+          <a:lstStyle/>
+          <a:p>
+            <a:pPr algn="ctr"/>
+            <a:endParaRPr lang="en-US"/>
+          </a:p>
+        </p:txBody>
+      </p:sp>
+      <p:sp>
+        <p:nvSpPr>
+          <p:cNvPr id="46" name="Freeform 45">
+            <a:extLst>
+              <a:ext uri="{FF2B5EF4-FFF2-40B4-BE49-F238E27FC236}">
+                <a16:creationId xmlns:a16="http://schemas.microsoft.com/office/drawing/2014/main" id="{5E7EEE5E-2E63-9B40-AEF2-3F4CB0AEA627}"/>
+              </a:ext>
+            </a:extLst>
+          </p:cNvPr>
+          <p:cNvSpPr/>
+          <p:nvPr/>
+        </p:nvSpPr>
+        <p:spPr>
+          <a:xfrm>
+            <a:off x="9033468" y="3476730"/>
+            <a:ext cx="1085028" cy="1708219"/>
+          </a:xfrm>
+          <a:custGeom>
+            <a:avLst/>
+            <a:gdLst>
+              <a:gd name="connsiteX0" fmla="*/ 0 w 1085028"/>
+              <a:gd name="connsiteY0" fmla="*/ 1708219 h 1708219"/>
+              <a:gd name="connsiteX1" fmla="*/ 974690 w 1085028"/>
+              <a:gd name="connsiteY1" fmla="*/ 1296237 h 1708219"/>
+              <a:gd name="connsiteX2" fmla="*/ 954594 w 1085028"/>
+              <a:gd name="connsiteY2" fmla="*/ 351692 h 1708219"/>
+              <a:gd name="connsiteX3" fmla="*/ 10048 w 1085028"/>
+              <a:gd name="connsiteY3" fmla="*/ 0 h 1708219"/>
+            </a:gdLst>
+            <a:ahLst/>
+            <a:cxnLst>
+              <a:cxn ang="0">
+                <a:pos x="connsiteX0" y="connsiteY0"/>
+              </a:cxn>
+              <a:cxn ang="0">
+                <a:pos x="connsiteX1" y="connsiteY1"/>
+              </a:cxn>
+              <a:cxn ang="0">
+                <a:pos x="connsiteX2" y="connsiteY2"/>
+              </a:cxn>
+              <a:cxn ang="0">
+                <a:pos x="connsiteX3" y="connsiteY3"/>
+              </a:cxn>
+            </a:cxnLst>
+            <a:rect l="l" t="t" r="r" b="b"/>
+            <a:pathLst>
+              <a:path w="1085028" h="1708219">
+                <a:moveTo>
+                  <a:pt x="0" y="1708219"/>
+                </a:moveTo>
+                <a:cubicBezTo>
+                  <a:pt x="407795" y="1615272"/>
+                  <a:pt x="815591" y="1522325"/>
+                  <a:pt x="974690" y="1296237"/>
+                </a:cubicBezTo>
+                <a:cubicBezTo>
+                  <a:pt x="1133789" y="1070149"/>
+                  <a:pt x="1115368" y="567731"/>
+                  <a:pt x="954594" y="351692"/>
+                </a:cubicBezTo>
+                <a:cubicBezTo>
+                  <a:pt x="793820" y="135652"/>
+                  <a:pt x="401934" y="67826"/>
+                  <a:pt x="10048" y="0"/>
+                </a:cubicBezTo>
+              </a:path>
+            </a:pathLst>
+          </a:custGeom>
+          <a:noFill/>
+          <a:ln>
+            <a:solidFill>
+              <a:schemeClr val="tx1">
+                <a:lumMod val="65000"/>
+                <a:lumOff val="35000"/>
+              </a:schemeClr>
+            </a:solidFill>
+            <a:headEnd type="none" w="med" len="med"/>
+            <a:tailEnd type="triangle" w="med" len="med"/>
+          </a:ln>
+        </p:spPr>
+        <p:style>
+          <a:lnRef idx="2">
+            <a:schemeClr val="accent1">
+              <a:shade val="50000"/>
+            </a:schemeClr>
+          </a:lnRef>
+          <a:fillRef idx="1">
+            <a:schemeClr val="accent1"/>
+          </a:fillRef>
+          <a:effectRef idx="0">
+            <a:schemeClr val="accent1"/>
+          </a:effectRef>
+          <a:fontRef idx="minor">
+            <a:schemeClr val="lt1"/>
+          </a:fontRef>
+        </p:style>
+        <p:txBody>
+          <a:bodyPr rtlCol="0" anchor="ctr"/>
+          <a:lstStyle/>
+          <a:p>
+            <a:pPr algn="ctr"/>
+            <a:endParaRPr lang="en-US"/>
+          </a:p>
+        </p:txBody>
+      </p:sp>
+    </p:spTree>
+    <p:extLst>
+      <p:ext uri="{BB962C8B-B14F-4D97-AF65-F5344CB8AC3E}">
+        <p14:creationId xmlns:p14="http://schemas.microsoft.com/office/powerpoint/2010/main" val="3379329983"/>
+      </p:ext>
+    </p:extLst>
+  </p:cSld>
+  <p:clrMapOvr>
+    <a:masterClrMapping/>
+  </p:clrMapOvr>
+</p:sld>
+</file>
+
+<file path=ppt/slides/slide3.xml><?xml version="1.0" encoding="utf-8"?>
 <p:sld xmlns:a="http://schemas.openxmlformats.org/drawingml/2006/main" xmlns:r="http://schemas.openxmlformats.org/officeDocument/2006/relationships" xmlns:p="http://schemas.openxmlformats.org/presentationml/2006/main">
   <p:cSld>
     <p:spTree>

</xml_diff>